<commit_message>
small changes for easier usage
</commit_message>
<xml_diff>
--- a/doc/BM_tutorial.pptx
+++ b/doc/BM_tutorial.pptx
@@ -14,15 +14,15 @@
     <p:sldId id="261" r:id="rId5"/>
     <p:sldId id="258" r:id="rId6"/>
     <p:sldId id="259" r:id="rId7"/>
-    <p:sldId id="260" r:id="rId8"/>
-    <p:sldId id="263" r:id="rId9"/>
+    <p:sldId id="263" r:id="rId8"/>
+    <p:sldId id="260" r:id="rId9"/>
     <p:sldId id="264" r:id="rId10"/>
     <p:sldId id="265" r:id="rId11"/>
     <p:sldId id="266" r:id="rId12"/>
-    <p:sldId id="267" r:id="rId13"/>
-    <p:sldId id="268" r:id="rId14"/>
-    <p:sldId id="269" r:id="rId15"/>
-    <p:sldId id="270" r:id="rId16"/>
+    <p:sldId id="269" r:id="rId13"/>
+    <p:sldId id="270" r:id="rId14"/>
+    <p:sldId id="267" r:id="rId15"/>
+    <p:sldId id="268" r:id="rId16"/>
   </p:sldIdLst>
   <p:sldSz cx="12192000" cy="6858000"/>
   <p:notesSz cx="6858000" cy="9144000"/>
@@ -211,7 +211,7 @@
           <a:p>
             <a:fld id="{21E3C4C6-65F2-4777-A87D-724D83F629CB}" type="datetimeFigureOut">
               <a:rPr lang="en-US" smtClean="0"/>
-              <a:t>9/15/2016</a:t>
+              <a:t>5/26/2018</a:t>
             </a:fld>
             <a:endParaRPr lang="en-US"/>
           </a:p>
@@ -610,7 +610,7 @@
           <a:p>
             <a:fld id="{0A05EDEE-081B-4C49-A8AF-C875B7AA09B5}" type="datetimeFigureOut">
               <a:rPr lang="en-US" smtClean="0"/>
-              <a:t>9/15/2016</a:t>
+              <a:t>5/26/2018</a:t>
             </a:fld>
             <a:endParaRPr lang="en-US"/>
           </a:p>
@@ -780,7 +780,7 @@
           <a:p>
             <a:fld id="{0A05EDEE-081B-4C49-A8AF-C875B7AA09B5}" type="datetimeFigureOut">
               <a:rPr lang="en-US" smtClean="0"/>
-              <a:t>9/15/2016</a:t>
+              <a:t>5/26/2018</a:t>
             </a:fld>
             <a:endParaRPr lang="en-US"/>
           </a:p>
@@ -960,7 +960,7 @@
           <a:p>
             <a:fld id="{0A05EDEE-081B-4C49-A8AF-C875B7AA09B5}" type="datetimeFigureOut">
               <a:rPr lang="en-US" smtClean="0"/>
-              <a:t>9/15/2016</a:t>
+              <a:t>5/26/2018</a:t>
             </a:fld>
             <a:endParaRPr lang="en-US"/>
           </a:p>
@@ -1130,7 +1130,7 @@
           <a:p>
             <a:fld id="{0A05EDEE-081B-4C49-A8AF-C875B7AA09B5}" type="datetimeFigureOut">
               <a:rPr lang="en-US" smtClean="0"/>
-              <a:t>9/15/2016</a:t>
+              <a:t>5/26/2018</a:t>
             </a:fld>
             <a:endParaRPr lang="en-US"/>
           </a:p>
@@ -1376,7 +1376,7 @@
           <a:p>
             <a:fld id="{0A05EDEE-081B-4C49-A8AF-C875B7AA09B5}" type="datetimeFigureOut">
               <a:rPr lang="en-US" smtClean="0"/>
-              <a:t>9/15/2016</a:t>
+              <a:t>5/26/2018</a:t>
             </a:fld>
             <a:endParaRPr lang="en-US"/>
           </a:p>
@@ -1608,7 +1608,7 @@
           <a:p>
             <a:fld id="{0A05EDEE-081B-4C49-A8AF-C875B7AA09B5}" type="datetimeFigureOut">
               <a:rPr lang="en-US" smtClean="0"/>
-              <a:t>9/15/2016</a:t>
+              <a:t>5/26/2018</a:t>
             </a:fld>
             <a:endParaRPr lang="en-US"/>
           </a:p>
@@ -1975,7 +1975,7 @@
           <a:p>
             <a:fld id="{0A05EDEE-081B-4C49-A8AF-C875B7AA09B5}" type="datetimeFigureOut">
               <a:rPr lang="en-US" smtClean="0"/>
-              <a:t>9/15/2016</a:t>
+              <a:t>5/26/2018</a:t>
             </a:fld>
             <a:endParaRPr lang="en-US"/>
           </a:p>
@@ -2093,7 +2093,7 @@
           <a:p>
             <a:fld id="{0A05EDEE-081B-4C49-A8AF-C875B7AA09B5}" type="datetimeFigureOut">
               <a:rPr lang="en-US" smtClean="0"/>
-              <a:t>9/15/2016</a:t>
+              <a:t>5/26/2018</a:t>
             </a:fld>
             <a:endParaRPr lang="en-US"/>
           </a:p>
@@ -2188,7 +2188,7 @@
           <a:p>
             <a:fld id="{0A05EDEE-081B-4C49-A8AF-C875B7AA09B5}" type="datetimeFigureOut">
               <a:rPr lang="en-US" smtClean="0"/>
-              <a:t>9/15/2016</a:t>
+              <a:t>5/26/2018</a:t>
             </a:fld>
             <a:endParaRPr lang="en-US"/>
           </a:p>
@@ -2465,7 +2465,7 @@
           <a:p>
             <a:fld id="{0A05EDEE-081B-4C49-A8AF-C875B7AA09B5}" type="datetimeFigureOut">
               <a:rPr lang="en-US" smtClean="0"/>
-              <a:t>9/15/2016</a:t>
+              <a:t>5/26/2018</a:t>
             </a:fld>
             <a:endParaRPr lang="en-US"/>
           </a:p>
@@ -2718,7 +2718,7 @@
           <a:p>
             <a:fld id="{0A05EDEE-081B-4C49-A8AF-C875B7AA09B5}" type="datetimeFigureOut">
               <a:rPr lang="en-US" smtClean="0"/>
-              <a:t>9/15/2016</a:t>
+              <a:t>5/26/2018</a:t>
             </a:fld>
             <a:endParaRPr lang="en-US"/>
           </a:p>
@@ -2931,7 +2931,7 @@
           <a:p>
             <a:fld id="{0A05EDEE-081B-4C49-A8AF-C875B7AA09B5}" type="datetimeFigureOut">
               <a:rPr lang="en-US" smtClean="0"/>
-              <a:t>9/15/2016</a:t>
+              <a:t>5/26/2018</a:t>
             </a:fld>
             <a:endParaRPr lang="en-US"/>
           </a:p>
@@ -3871,8 +3871,533 @@
           <a:lstStyle/>
           <a:p>
             <a:r>
+              <a:rPr lang="en-US" dirty="0" err="1" smtClean="0"/>
+              <a:t>BATCH_simulation</a:t>
+            </a:r>
+            <a:endParaRPr lang="en-US" dirty="0"/>
+          </a:p>
+        </p:txBody>
+      </p:sp>
+      <p:sp>
+        <p:nvSpPr>
+          <p:cNvPr id="3" name="Inhaltsplatzhalter 2"/>
+          <p:cNvSpPr>
+            <a:spLocks noGrp="1"/>
+          </p:cNvSpPr>
+          <p:nvPr>
+            <p:ph idx="1"/>
+          </p:nvPr>
+        </p:nvSpPr>
+        <p:spPr>
+          <a:xfrm>
+            <a:off x="838200" y="1489723"/>
+            <a:ext cx="10515600" cy="4351338"/>
+          </a:xfrm>
+        </p:spPr>
+        <p:txBody>
+          <a:bodyPr/>
+          <a:lstStyle/>
+          <a:p>
+            <a:r>
+              <a:rPr lang="en-US" dirty="0" smtClean="0"/>
+              <a:t>To see all the hydroxyls of glucose just increase FREQ to mimic a 100 T scanner and increase the sampling of </a:t>
+            </a:r>
+            <a:r>
+              <a:rPr lang="en-US" dirty="0" err="1" smtClean="0"/>
+              <a:t>xZspec</a:t>
+            </a:r>
+            <a:endParaRPr lang="en-US" dirty="0" smtClean="0"/>
+          </a:p>
+          <a:p>
+            <a:r>
+              <a:rPr lang="en-US" dirty="0" err="1" smtClean="0"/>
+              <a:t>Sim.FREQ</a:t>
+            </a:r>
+            <a:r>
+              <a:rPr lang="en-US" dirty="0" smtClean="0"/>
+              <a:t>= 100*gamma_;</a:t>
+            </a:r>
+          </a:p>
+          <a:p>
+            <a:endParaRPr lang="en-US" dirty="0" smtClean="0"/>
+          </a:p>
+          <a:p>
+            <a:endParaRPr lang="en-US" dirty="0"/>
+          </a:p>
+        </p:txBody>
+      </p:sp>
+      <p:sp>
+        <p:nvSpPr>
+          <p:cNvPr id="4" name="Textfeld 3"/>
+          <p:cNvSpPr txBox="1"/>
+          <p:nvPr/>
+        </p:nvSpPr>
+        <p:spPr>
+          <a:xfrm>
+            <a:off x="950168" y="2957804"/>
+            <a:ext cx="10151818" cy="3487986"/>
+          </a:xfrm>
+          <a:prstGeom prst="rect">
+            <a:avLst/>
+          </a:prstGeom>
+          <a:noFill/>
+        </p:spPr>
+        <p:txBody>
+          <a:bodyPr wrap="square" numCol="2" rtlCol="0">
+            <a:noAutofit/>
+          </a:bodyPr>
+          <a:lstStyle/>
+          <a:p>
+            <a:r>
+              <a:rPr lang="en-US" dirty="0" smtClean="0"/>
+              <a:t>      </a:t>
+            </a:r>
+            <a:r>
+              <a:rPr lang="en-US" sz="1200" dirty="0" smtClean="0"/>
+              <a:t>%Pool B</a:t>
+            </a:r>
+            <a:br>
+              <a:rPr lang="en-US" sz="1200" dirty="0" smtClean="0"/>
+            </a:br>
+            <a:r>
+              <a:rPr lang="en-US" sz="1200" dirty="0" smtClean="0"/>
+              <a:t>        </a:t>
+            </a:r>
+            <a:r>
+              <a:rPr lang="en-US" sz="1200" dirty="0" err="1" smtClean="0"/>
+              <a:t>Sim.dwB</a:t>
+            </a:r>
+            <a:r>
+              <a:rPr lang="en-US" sz="1200" dirty="0" smtClean="0"/>
+              <a:t>=2;</a:t>
+            </a:r>
+          </a:p>
+          <a:p>
+            <a:r>
+              <a:rPr lang="en-US" sz="1200" dirty="0" smtClean="0"/>
+              <a:t>        Sim.R2B=66.66;</a:t>
+            </a:r>
+          </a:p>
+          <a:p>
+            <a:r>
+              <a:rPr lang="en-US" sz="1200" dirty="0" smtClean="0"/>
+              <a:t>        </a:t>
+            </a:r>
+            <a:r>
+              <a:rPr lang="en-US" sz="1200" dirty="0" err="1" smtClean="0"/>
+              <a:t>Sim.fB</a:t>
+            </a:r>
+            <a:r>
+              <a:rPr lang="en-US" sz="1200" dirty="0" smtClean="0"/>
+              <a:t>=0.0045; % 100mM</a:t>
+            </a:r>
+          </a:p>
+          <a:p>
+            <a:r>
+              <a:rPr lang="en-US" sz="1200" dirty="0" smtClean="0"/>
+              <a:t>        </a:t>
+            </a:r>
+            <a:r>
+              <a:rPr lang="en-US" sz="1200" dirty="0" err="1" smtClean="0"/>
+              <a:t>Sim.kBA</a:t>
+            </a:r>
+            <a:r>
+              <a:rPr lang="en-US" sz="1200" dirty="0" smtClean="0"/>
+              <a:t>=5000;</a:t>
+            </a:r>
+          </a:p>
+          <a:p>
+            <a:r>
+              <a:rPr lang="en-US" sz="1200" dirty="0" smtClean="0"/>
+              <a:t>        </a:t>
+            </a:r>
+          </a:p>
+          <a:p>
+            <a:r>
+              <a:rPr lang="en-US" sz="1200" dirty="0" smtClean="0"/>
+              <a:t>        % Pool D</a:t>
+            </a:r>
+          </a:p>
+          <a:p>
+            <a:r>
+              <a:rPr lang="en-US" sz="1200" dirty="0" smtClean="0"/>
+              <a:t>        </a:t>
+            </a:r>
+            <a:r>
+              <a:rPr lang="en-US" sz="1200" dirty="0" err="1" smtClean="0"/>
+              <a:t>Sim.dwD</a:t>
+            </a:r>
+            <a:r>
+              <a:rPr lang="en-US" sz="1200" dirty="0" smtClean="0"/>
+              <a:t>=2.2;</a:t>
+            </a:r>
+          </a:p>
+          <a:p>
+            <a:r>
+              <a:rPr lang="en-US" sz="1200" dirty="0" smtClean="0"/>
+              <a:t>        Sim.R2D=66.66;</a:t>
+            </a:r>
+          </a:p>
+          <a:p>
+            <a:r>
+              <a:rPr lang="en-US" sz="1200" dirty="0" smtClean="0"/>
+              <a:t>        </a:t>
+            </a:r>
+            <a:r>
+              <a:rPr lang="en-US" sz="1200" dirty="0" err="1" smtClean="0"/>
+              <a:t>Sim.fD</a:t>
+            </a:r>
+            <a:r>
+              <a:rPr lang="en-US" sz="1200" dirty="0" smtClean="0"/>
+              <a:t>=0.0009; </a:t>
+            </a:r>
+          </a:p>
+          <a:p>
+            <a:r>
+              <a:rPr lang="en-US" sz="1200" dirty="0" smtClean="0"/>
+              <a:t>        </a:t>
+            </a:r>
+            <a:r>
+              <a:rPr lang="en-US" sz="1200" dirty="0" err="1" smtClean="0"/>
+              <a:t>Sim.kDA</a:t>
+            </a:r>
+            <a:r>
+              <a:rPr lang="en-US" sz="1200" dirty="0" smtClean="0"/>
+              <a:t>=500;</a:t>
+            </a:r>
+          </a:p>
+          <a:p>
+            <a:r>
+              <a:rPr lang="en-US" sz="1200" dirty="0" smtClean="0"/>
+              <a:t>        </a:t>
+            </a:r>
+          </a:p>
+          <a:p>
+            <a:r>
+              <a:rPr lang="en-US" sz="1200" dirty="0" smtClean="0"/>
+              <a:t>        % Pool E</a:t>
+            </a:r>
+          </a:p>
+          <a:p>
+            <a:r>
+              <a:rPr lang="en-US" sz="1200" dirty="0" smtClean="0"/>
+              <a:t>        </a:t>
+            </a:r>
+            <a:r>
+              <a:rPr lang="en-US" sz="1200" dirty="0" err="1" smtClean="0"/>
+              <a:t>Sim.dwE</a:t>
+            </a:r>
+            <a:r>
+              <a:rPr lang="en-US" sz="1200" dirty="0" smtClean="0"/>
+              <a:t>=2.8;</a:t>
+            </a:r>
+          </a:p>
+          <a:p>
+            <a:r>
+              <a:rPr lang="en-US" sz="1200" dirty="0" smtClean="0"/>
+              <a:t>        Sim.R2E=66.66;</a:t>
+            </a:r>
+          </a:p>
+          <a:p>
+            <a:r>
+              <a:rPr lang="en-US" sz="1200" dirty="0" smtClean="0"/>
+              <a:t>        </a:t>
+            </a:r>
+            <a:r>
+              <a:rPr lang="en-US" sz="1200" dirty="0" err="1" smtClean="0"/>
+              <a:t>Sim.fE</a:t>
+            </a:r>
+            <a:r>
+              <a:rPr lang="en-US" sz="1200" dirty="0" smtClean="0"/>
+              <a:t>=0.0009; </a:t>
+            </a:r>
+          </a:p>
+          <a:p>
+            <a:r>
+              <a:rPr lang="en-US" sz="1200" dirty="0" smtClean="0"/>
+              <a:t>        </a:t>
+            </a:r>
+            <a:r>
+              <a:rPr lang="en-US" sz="1200" dirty="0" err="1" smtClean="0"/>
+              <a:t>Sim.kEA</a:t>
+            </a:r>
+            <a:r>
+              <a:rPr lang="en-US" sz="1200" dirty="0" smtClean="0"/>
+              <a:t>=1000</a:t>
+            </a:r>
+          </a:p>
+          <a:p>
+            <a:endParaRPr lang="en-US" sz="1200" dirty="0" smtClean="0"/>
+          </a:p>
+          <a:p>
+            <a:r>
+              <a:rPr lang="en-US" sz="1200" dirty="0" smtClean="0"/>
+              <a:t>        </a:t>
+            </a:r>
+          </a:p>
+          <a:p>
+            <a:r>
+              <a:rPr lang="en-US" sz="1200" dirty="0" smtClean="0"/>
+              <a:t>        % Pool F</a:t>
+            </a:r>
+          </a:p>
+          <a:p>
+            <a:r>
+              <a:rPr lang="en-US" sz="1200" dirty="0" smtClean="0"/>
+              <a:t>        </a:t>
+            </a:r>
+            <a:r>
+              <a:rPr lang="en-US" sz="1200" dirty="0" err="1" smtClean="0"/>
+              <a:t>Sim.dwF</a:t>
+            </a:r>
+            <a:r>
+              <a:rPr lang="en-US" sz="1200" dirty="0" smtClean="0"/>
+              <a:t>=0.6;</a:t>
+            </a:r>
+          </a:p>
+          <a:p>
+            <a:r>
+              <a:rPr lang="en-US" sz="1200" dirty="0" smtClean="0"/>
+              <a:t>        Sim.R2F=66.66;</a:t>
+            </a:r>
+          </a:p>
+          <a:p>
+            <a:r>
+              <a:rPr lang="en-US" sz="1200" dirty="0" smtClean="0"/>
+              <a:t>        </a:t>
+            </a:r>
+            <a:r>
+              <a:rPr lang="en-US" sz="1200" dirty="0" err="1" smtClean="0"/>
+              <a:t>Sim.fF</a:t>
+            </a:r>
+            <a:r>
+              <a:rPr lang="en-US" sz="1200" dirty="0" smtClean="0"/>
+              <a:t>=0.0009; % 0.0045/5 for 100mM and 5 exchanging protons</a:t>
+            </a:r>
+          </a:p>
+          <a:p>
+            <a:r>
+              <a:rPr lang="en-US" sz="1200" dirty="0" smtClean="0"/>
+              <a:t>        </a:t>
+            </a:r>
+            <a:r>
+              <a:rPr lang="en-US" sz="1200" dirty="0" err="1" smtClean="0"/>
+              <a:t>Sim.kFA</a:t>
+            </a:r>
+            <a:r>
+              <a:rPr lang="en-US" sz="1200" dirty="0" smtClean="0"/>
+              <a:t>=5000;</a:t>
+            </a:r>
+          </a:p>
+          <a:p>
+            <a:r>
+              <a:rPr lang="en-US" sz="1200" dirty="0" smtClean="0"/>
+              <a:t>        </a:t>
+            </a:r>
+          </a:p>
+          <a:p>
+            <a:r>
+              <a:rPr lang="en-US" sz="1200" dirty="0" smtClean="0"/>
+              <a:t>        % Pool G</a:t>
+            </a:r>
+          </a:p>
+          <a:p>
+            <a:r>
+              <a:rPr lang="en-US" sz="1200" dirty="0" smtClean="0"/>
+              <a:t>        </a:t>
+            </a:r>
+            <a:r>
+              <a:rPr lang="en-US" sz="1200" dirty="0" err="1" smtClean="0"/>
+              <a:t>Sim.dwG</a:t>
+            </a:r>
+            <a:r>
+              <a:rPr lang="en-US" sz="1200" dirty="0" smtClean="0"/>
+              <a:t>=1.2;</a:t>
+            </a:r>
+          </a:p>
+          <a:p>
+            <a:r>
+              <a:rPr lang="en-US" sz="1200" dirty="0" smtClean="0"/>
+              <a:t>        Sim.R2G=66.66;</a:t>
+            </a:r>
+          </a:p>
+          <a:p>
+            <a:r>
+              <a:rPr lang="en-US" sz="1200" dirty="0" smtClean="0"/>
+              <a:t>        </a:t>
+            </a:r>
+            <a:r>
+              <a:rPr lang="en-US" sz="1200" dirty="0" err="1" smtClean="0"/>
+              <a:t>Sim.fG</a:t>
+            </a:r>
+            <a:r>
+              <a:rPr lang="en-US" sz="1200" dirty="0" smtClean="0"/>
+              <a:t>=0.0009; </a:t>
+            </a:r>
+          </a:p>
+          <a:p>
+            <a:r>
+              <a:rPr lang="en-US" sz="1200" dirty="0" smtClean="0"/>
+              <a:t>        </a:t>
+            </a:r>
+            <a:r>
+              <a:rPr lang="en-US" sz="1200" dirty="0" err="1" smtClean="0"/>
+              <a:t>Sim.kGA</a:t>
+            </a:r>
+            <a:r>
+              <a:rPr lang="en-US" sz="1200" dirty="0" smtClean="0"/>
+              <a:t>=5000;</a:t>
+            </a:r>
+          </a:p>
+          <a:p>
+            <a:endParaRPr lang="en-US" dirty="0"/>
+          </a:p>
+        </p:txBody>
+      </p:sp>
+    </p:spTree>
+    <p:extLst>
+      <p:ext uri="{BB962C8B-B14F-4D97-AF65-F5344CB8AC3E}">
+        <p14:creationId xmlns:p14="http://schemas.microsoft.com/office/powerpoint/2010/main" val="2862043922"/>
+      </p:ext>
+    </p:extLst>
+  </p:cSld>
+  <p:clrMapOvr>
+    <a:masterClrMapping/>
+  </p:clrMapOvr>
+</p:sld>
+</file>
+
+<file path=ppt/slides/slide13.xml><?xml version="1.0" encoding="utf-8"?>
+<p:sld xmlns:a="http://schemas.openxmlformats.org/drawingml/2006/main" xmlns:r="http://schemas.openxmlformats.org/officeDocument/2006/relationships" xmlns:p="http://schemas.openxmlformats.org/presentationml/2006/main">
+  <p:cSld>
+    <p:spTree>
+      <p:nvGrpSpPr>
+        <p:cNvPr id="1" name=""/>
+        <p:cNvGrpSpPr/>
+        <p:nvPr/>
+      </p:nvGrpSpPr>
+      <p:grpSpPr>
+        <a:xfrm>
+          <a:off x="0" y="0"/>
+          <a:ext cx="0" cy="0"/>
+          <a:chOff x="0" y="0"/>
+          <a:chExt cx="0" cy="0"/>
+        </a:xfrm>
+      </p:grpSpPr>
+      <p:sp>
+        <p:nvSpPr>
+          <p:cNvPr id="2" name="Titel 1"/>
+          <p:cNvSpPr>
+            <a:spLocks noGrp="1"/>
+          </p:cNvSpPr>
+          <p:nvPr>
+            <p:ph type="title"/>
+          </p:nvPr>
+        </p:nvSpPr>
+        <p:spPr/>
+        <p:txBody>
+          <a:bodyPr/>
+          <a:lstStyle/>
+          <a:p>
+            <a:endParaRPr lang="en-US"/>
+          </a:p>
+        </p:txBody>
+      </p:sp>
+      <p:sp>
+        <p:nvSpPr>
+          <p:cNvPr id="3" name="Inhaltsplatzhalter 2"/>
+          <p:cNvSpPr>
+            <a:spLocks noGrp="1"/>
+          </p:cNvSpPr>
+          <p:nvPr>
+            <p:ph idx="1"/>
+          </p:nvPr>
+        </p:nvSpPr>
+        <p:spPr/>
+        <p:txBody>
+          <a:bodyPr/>
+          <a:lstStyle/>
+          <a:p>
+            <a:endParaRPr lang="en-US"/>
+          </a:p>
+        </p:txBody>
+      </p:sp>
+      <p:pic>
+        <p:nvPicPr>
+          <p:cNvPr id="4" name="Grafik 3"/>
+          <p:cNvPicPr>
+            <a:picLocks noChangeAspect="1"/>
+          </p:cNvPicPr>
+          <p:nvPr/>
+        </p:nvPicPr>
+        <p:blipFill>
+          <a:blip r:embed="rId2"/>
+          <a:stretch>
+            <a:fillRect/>
+          </a:stretch>
+        </p:blipFill>
+        <p:spPr>
+          <a:xfrm>
+            <a:off x="195941" y="143724"/>
+            <a:ext cx="11785537" cy="6536994"/>
+          </a:xfrm>
+          <a:prstGeom prst="rect">
+            <a:avLst/>
+          </a:prstGeom>
+        </p:spPr>
+      </p:pic>
+    </p:spTree>
+    <p:extLst>
+      <p:ext uri="{BB962C8B-B14F-4D97-AF65-F5344CB8AC3E}">
+        <p14:creationId xmlns:p14="http://schemas.microsoft.com/office/powerpoint/2010/main" val="3874179921"/>
+      </p:ext>
+    </p:extLst>
+  </p:cSld>
+  <p:clrMapOvr>
+    <a:masterClrMapping/>
+  </p:clrMapOvr>
+</p:sld>
+</file>
+
+<file path=ppt/slides/slide14.xml><?xml version="1.0" encoding="utf-8"?>
+<p:sld xmlns:a="http://schemas.openxmlformats.org/drawingml/2006/main" xmlns:r="http://schemas.openxmlformats.org/officeDocument/2006/relationships" xmlns:p="http://schemas.openxmlformats.org/presentationml/2006/main">
+  <p:cSld>
+    <p:spTree>
+      <p:nvGrpSpPr>
+        <p:cNvPr id="1" name=""/>
+        <p:cNvGrpSpPr/>
+        <p:nvPr/>
+      </p:nvGrpSpPr>
+      <p:grpSpPr>
+        <a:xfrm>
+          <a:off x="0" y="0"/>
+          <a:ext cx="0" cy="0"/>
+          <a:chOff x="0" y="0"/>
+          <a:chExt cx="0" cy="0"/>
+        </a:xfrm>
+      </p:grpSpPr>
+      <p:sp>
+        <p:nvSpPr>
+          <p:cNvPr id="2" name="Titel 1"/>
+          <p:cNvSpPr>
+            <a:spLocks noGrp="1"/>
+          </p:cNvSpPr>
+          <p:nvPr>
+            <p:ph type="title"/>
+          </p:nvPr>
+        </p:nvSpPr>
+        <p:spPr/>
+        <p:txBody>
+          <a:bodyPr/>
+          <a:lstStyle/>
+          <a:p>
+            <a:r>
               <a:rPr lang="de-DE" dirty="0" err="1" smtClean="0"/>
               <a:t>BATCH_simulation_readout</a:t>
+            </a:r>
+            <a:r>
+              <a:rPr lang="de-DE" dirty="0" smtClean="0"/>
+              <a:t> WIP</a:t>
             </a:r>
             <a:endParaRPr lang="en-US" dirty="0"/>
           </a:p>
@@ -3949,7 +4474,7 @@
 </p:sld>
 </file>
 
-<file path=ppt/slides/slide13.xml><?xml version="1.0" encoding="utf-8"?>
+<file path=ppt/slides/slide15.xml><?xml version="1.0" encoding="utf-8"?>
 <p:sld xmlns:a="http://schemas.openxmlformats.org/drawingml/2006/main" xmlns:r="http://schemas.openxmlformats.org/officeDocument/2006/relationships" xmlns:p="http://schemas.openxmlformats.org/presentationml/2006/main">
   <p:cSld>
     <p:spTree>
@@ -4054,527 +4579,6 @@
     <p:extLst>
       <p:ext uri="{BB962C8B-B14F-4D97-AF65-F5344CB8AC3E}">
         <p14:creationId xmlns:p14="http://schemas.microsoft.com/office/powerpoint/2010/main" val="1941657079"/>
-      </p:ext>
-    </p:extLst>
-  </p:cSld>
-  <p:clrMapOvr>
-    <a:masterClrMapping/>
-  </p:clrMapOvr>
-</p:sld>
-</file>
-
-<file path=ppt/slides/slide14.xml><?xml version="1.0" encoding="utf-8"?>
-<p:sld xmlns:a="http://schemas.openxmlformats.org/drawingml/2006/main" xmlns:r="http://schemas.openxmlformats.org/officeDocument/2006/relationships" xmlns:p="http://schemas.openxmlformats.org/presentationml/2006/main">
-  <p:cSld>
-    <p:spTree>
-      <p:nvGrpSpPr>
-        <p:cNvPr id="1" name=""/>
-        <p:cNvGrpSpPr/>
-        <p:nvPr/>
-      </p:nvGrpSpPr>
-      <p:grpSpPr>
-        <a:xfrm>
-          <a:off x="0" y="0"/>
-          <a:ext cx="0" cy="0"/>
-          <a:chOff x="0" y="0"/>
-          <a:chExt cx="0" cy="0"/>
-        </a:xfrm>
-      </p:grpSpPr>
-      <p:sp>
-        <p:nvSpPr>
-          <p:cNvPr id="2" name="Titel 1"/>
-          <p:cNvSpPr>
-            <a:spLocks noGrp="1"/>
-          </p:cNvSpPr>
-          <p:nvPr>
-            <p:ph type="title"/>
-          </p:nvPr>
-        </p:nvSpPr>
-        <p:spPr/>
-        <p:txBody>
-          <a:bodyPr/>
-          <a:lstStyle/>
-          <a:p>
-            <a:r>
-              <a:rPr lang="en-US" dirty="0" err="1" smtClean="0"/>
-              <a:t>BATCH_simulation</a:t>
-            </a:r>
-            <a:endParaRPr lang="en-US" dirty="0"/>
-          </a:p>
-        </p:txBody>
-      </p:sp>
-      <p:sp>
-        <p:nvSpPr>
-          <p:cNvPr id="3" name="Inhaltsplatzhalter 2"/>
-          <p:cNvSpPr>
-            <a:spLocks noGrp="1"/>
-          </p:cNvSpPr>
-          <p:nvPr>
-            <p:ph idx="1"/>
-          </p:nvPr>
-        </p:nvSpPr>
-        <p:spPr>
-          <a:xfrm>
-            <a:off x="838200" y="1489723"/>
-            <a:ext cx="10515600" cy="4351338"/>
-          </a:xfrm>
-        </p:spPr>
-        <p:txBody>
-          <a:bodyPr/>
-          <a:lstStyle/>
-          <a:p>
-            <a:r>
-              <a:rPr lang="en-US" dirty="0" smtClean="0"/>
-              <a:t>To see all the hydroxyls of glucose just increase FREQ to mimic a 100 T scanner and increase the sampling of </a:t>
-            </a:r>
-            <a:r>
-              <a:rPr lang="en-US" dirty="0" err="1" smtClean="0"/>
-              <a:t>xZspec</a:t>
-            </a:r>
-            <a:endParaRPr lang="en-US" dirty="0" smtClean="0"/>
-          </a:p>
-          <a:p>
-            <a:r>
-              <a:rPr lang="en-US" dirty="0" err="1" smtClean="0"/>
-              <a:t>Sim.FREQ</a:t>
-            </a:r>
-            <a:r>
-              <a:rPr lang="en-US" dirty="0" smtClean="0"/>
-              <a:t>= 100*gamma_;</a:t>
-            </a:r>
-          </a:p>
-          <a:p>
-            <a:endParaRPr lang="en-US" dirty="0" smtClean="0"/>
-          </a:p>
-          <a:p>
-            <a:endParaRPr lang="en-US" dirty="0"/>
-          </a:p>
-        </p:txBody>
-      </p:sp>
-      <p:sp>
-        <p:nvSpPr>
-          <p:cNvPr id="4" name="Textfeld 3"/>
-          <p:cNvSpPr txBox="1"/>
-          <p:nvPr/>
-        </p:nvSpPr>
-        <p:spPr>
-          <a:xfrm>
-            <a:off x="950168" y="2957804"/>
-            <a:ext cx="10151818" cy="3487986"/>
-          </a:xfrm>
-          <a:prstGeom prst="rect">
-            <a:avLst/>
-          </a:prstGeom>
-          <a:noFill/>
-        </p:spPr>
-        <p:txBody>
-          <a:bodyPr wrap="square" numCol="2" rtlCol="0">
-            <a:noAutofit/>
-          </a:bodyPr>
-          <a:lstStyle/>
-          <a:p>
-            <a:r>
-              <a:rPr lang="en-US" dirty="0" smtClean="0"/>
-              <a:t>      </a:t>
-            </a:r>
-            <a:r>
-              <a:rPr lang="en-US" sz="1200" dirty="0" smtClean="0"/>
-              <a:t>%Pool B</a:t>
-            </a:r>
-            <a:br>
-              <a:rPr lang="en-US" sz="1200" dirty="0" smtClean="0"/>
-            </a:br>
-            <a:r>
-              <a:rPr lang="en-US" sz="1200" dirty="0" smtClean="0"/>
-              <a:t>        </a:t>
-            </a:r>
-            <a:r>
-              <a:rPr lang="en-US" sz="1200" dirty="0" err="1" smtClean="0"/>
-              <a:t>Sim.dwB</a:t>
-            </a:r>
-            <a:r>
-              <a:rPr lang="en-US" sz="1200" dirty="0" smtClean="0"/>
-              <a:t>=2;</a:t>
-            </a:r>
-          </a:p>
-          <a:p>
-            <a:r>
-              <a:rPr lang="en-US" sz="1200" dirty="0" smtClean="0"/>
-              <a:t>        Sim.R2B=66.66;</a:t>
-            </a:r>
-          </a:p>
-          <a:p>
-            <a:r>
-              <a:rPr lang="en-US" sz="1200" dirty="0" smtClean="0"/>
-              <a:t>        </a:t>
-            </a:r>
-            <a:r>
-              <a:rPr lang="en-US" sz="1200" dirty="0" err="1" smtClean="0"/>
-              <a:t>Sim.fB</a:t>
-            </a:r>
-            <a:r>
-              <a:rPr lang="en-US" sz="1200" dirty="0" smtClean="0"/>
-              <a:t>=0.0045; % 100mM</a:t>
-            </a:r>
-          </a:p>
-          <a:p>
-            <a:r>
-              <a:rPr lang="en-US" sz="1200" dirty="0" smtClean="0"/>
-              <a:t>        </a:t>
-            </a:r>
-            <a:r>
-              <a:rPr lang="en-US" sz="1200" dirty="0" err="1" smtClean="0"/>
-              <a:t>Sim.kBA</a:t>
-            </a:r>
-            <a:r>
-              <a:rPr lang="en-US" sz="1200" dirty="0" smtClean="0"/>
-              <a:t>=5000;</a:t>
-            </a:r>
-          </a:p>
-          <a:p>
-            <a:r>
-              <a:rPr lang="en-US" sz="1200" dirty="0" smtClean="0"/>
-              <a:t>        </a:t>
-            </a:r>
-          </a:p>
-          <a:p>
-            <a:r>
-              <a:rPr lang="en-US" sz="1200" dirty="0" smtClean="0"/>
-              <a:t>        % Pool D</a:t>
-            </a:r>
-          </a:p>
-          <a:p>
-            <a:r>
-              <a:rPr lang="en-US" sz="1200" dirty="0" smtClean="0"/>
-              <a:t>        </a:t>
-            </a:r>
-            <a:r>
-              <a:rPr lang="en-US" sz="1200" dirty="0" err="1" smtClean="0"/>
-              <a:t>Sim.dwD</a:t>
-            </a:r>
-            <a:r>
-              <a:rPr lang="en-US" sz="1200" dirty="0" smtClean="0"/>
-              <a:t>=2.2;</a:t>
-            </a:r>
-          </a:p>
-          <a:p>
-            <a:r>
-              <a:rPr lang="en-US" sz="1200" dirty="0" smtClean="0"/>
-              <a:t>        Sim.R2D=66.66;</a:t>
-            </a:r>
-          </a:p>
-          <a:p>
-            <a:r>
-              <a:rPr lang="en-US" sz="1200" dirty="0" smtClean="0"/>
-              <a:t>        </a:t>
-            </a:r>
-            <a:r>
-              <a:rPr lang="en-US" sz="1200" dirty="0" err="1" smtClean="0"/>
-              <a:t>Sim.fD</a:t>
-            </a:r>
-            <a:r>
-              <a:rPr lang="en-US" sz="1200" dirty="0" smtClean="0"/>
-              <a:t>=0.0009; </a:t>
-            </a:r>
-          </a:p>
-          <a:p>
-            <a:r>
-              <a:rPr lang="en-US" sz="1200" dirty="0" smtClean="0"/>
-              <a:t>        </a:t>
-            </a:r>
-            <a:r>
-              <a:rPr lang="en-US" sz="1200" dirty="0" err="1" smtClean="0"/>
-              <a:t>Sim.kDA</a:t>
-            </a:r>
-            <a:r>
-              <a:rPr lang="en-US" sz="1200" dirty="0" smtClean="0"/>
-              <a:t>=500;</a:t>
-            </a:r>
-          </a:p>
-          <a:p>
-            <a:r>
-              <a:rPr lang="en-US" sz="1200" dirty="0" smtClean="0"/>
-              <a:t>        </a:t>
-            </a:r>
-          </a:p>
-          <a:p>
-            <a:r>
-              <a:rPr lang="en-US" sz="1200" dirty="0" smtClean="0"/>
-              <a:t>        % Pool E</a:t>
-            </a:r>
-          </a:p>
-          <a:p>
-            <a:r>
-              <a:rPr lang="en-US" sz="1200" dirty="0" smtClean="0"/>
-              <a:t>        </a:t>
-            </a:r>
-            <a:r>
-              <a:rPr lang="en-US" sz="1200" dirty="0" err="1" smtClean="0"/>
-              <a:t>Sim.dwE</a:t>
-            </a:r>
-            <a:r>
-              <a:rPr lang="en-US" sz="1200" dirty="0" smtClean="0"/>
-              <a:t>=2.8;</a:t>
-            </a:r>
-          </a:p>
-          <a:p>
-            <a:r>
-              <a:rPr lang="en-US" sz="1200" dirty="0" smtClean="0"/>
-              <a:t>        Sim.R2E=66.66;</a:t>
-            </a:r>
-          </a:p>
-          <a:p>
-            <a:r>
-              <a:rPr lang="en-US" sz="1200" dirty="0" smtClean="0"/>
-              <a:t>        </a:t>
-            </a:r>
-            <a:r>
-              <a:rPr lang="en-US" sz="1200" dirty="0" err="1" smtClean="0"/>
-              <a:t>Sim.fE</a:t>
-            </a:r>
-            <a:r>
-              <a:rPr lang="en-US" sz="1200" dirty="0" smtClean="0"/>
-              <a:t>=0.0009; </a:t>
-            </a:r>
-          </a:p>
-          <a:p>
-            <a:r>
-              <a:rPr lang="en-US" sz="1200" dirty="0" smtClean="0"/>
-              <a:t>        </a:t>
-            </a:r>
-            <a:r>
-              <a:rPr lang="en-US" sz="1200" dirty="0" err="1" smtClean="0"/>
-              <a:t>Sim.kEA</a:t>
-            </a:r>
-            <a:r>
-              <a:rPr lang="en-US" sz="1200" dirty="0" smtClean="0"/>
-              <a:t>=1000</a:t>
-            </a:r>
-          </a:p>
-          <a:p>
-            <a:endParaRPr lang="en-US" sz="1200" dirty="0" smtClean="0"/>
-          </a:p>
-          <a:p>
-            <a:r>
-              <a:rPr lang="en-US" sz="1200" dirty="0" smtClean="0"/>
-              <a:t>        </a:t>
-            </a:r>
-          </a:p>
-          <a:p>
-            <a:r>
-              <a:rPr lang="en-US" sz="1200" dirty="0" smtClean="0"/>
-              <a:t>        % Pool F</a:t>
-            </a:r>
-          </a:p>
-          <a:p>
-            <a:r>
-              <a:rPr lang="en-US" sz="1200" dirty="0" smtClean="0"/>
-              <a:t>        </a:t>
-            </a:r>
-            <a:r>
-              <a:rPr lang="en-US" sz="1200" dirty="0" err="1" smtClean="0"/>
-              <a:t>Sim.dwF</a:t>
-            </a:r>
-            <a:r>
-              <a:rPr lang="en-US" sz="1200" dirty="0" smtClean="0"/>
-              <a:t>=0.6;</a:t>
-            </a:r>
-          </a:p>
-          <a:p>
-            <a:r>
-              <a:rPr lang="en-US" sz="1200" dirty="0" smtClean="0"/>
-              <a:t>        Sim.R2F=66.66;</a:t>
-            </a:r>
-          </a:p>
-          <a:p>
-            <a:r>
-              <a:rPr lang="en-US" sz="1200" dirty="0" smtClean="0"/>
-              <a:t>        </a:t>
-            </a:r>
-            <a:r>
-              <a:rPr lang="en-US" sz="1200" dirty="0" err="1" smtClean="0"/>
-              <a:t>Sim.fF</a:t>
-            </a:r>
-            <a:r>
-              <a:rPr lang="en-US" sz="1200" dirty="0" smtClean="0"/>
-              <a:t>=0.0009; % 0.0045/5 for 100mM and 5 exchanging protons</a:t>
-            </a:r>
-          </a:p>
-          <a:p>
-            <a:r>
-              <a:rPr lang="en-US" sz="1200" dirty="0" smtClean="0"/>
-              <a:t>        </a:t>
-            </a:r>
-            <a:r>
-              <a:rPr lang="en-US" sz="1200" dirty="0" err="1" smtClean="0"/>
-              <a:t>Sim.kFA</a:t>
-            </a:r>
-            <a:r>
-              <a:rPr lang="en-US" sz="1200" dirty="0" smtClean="0"/>
-              <a:t>=5000;</a:t>
-            </a:r>
-          </a:p>
-          <a:p>
-            <a:r>
-              <a:rPr lang="en-US" sz="1200" dirty="0" smtClean="0"/>
-              <a:t>        </a:t>
-            </a:r>
-          </a:p>
-          <a:p>
-            <a:r>
-              <a:rPr lang="en-US" sz="1200" dirty="0" smtClean="0"/>
-              <a:t>        % Pool G</a:t>
-            </a:r>
-          </a:p>
-          <a:p>
-            <a:r>
-              <a:rPr lang="en-US" sz="1200" dirty="0" smtClean="0"/>
-              <a:t>        </a:t>
-            </a:r>
-            <a:r>
-              <a:rPr lang="en-US" sz="1200" dirty="0" err="1" smtClean="0"/>
-              <a:t>Sim.dwG</a:t>
-            </a:r>
-            <a:r>
-              <a:rPr lang="en-US" sz="1200" dirty="0" smtClean="0"/>
-              <a:t>=1.2;</a:t>
-            </a:r>
-          </a:p>
-          <a:p>
-            <a:r>
-              <a:rPr lang="en-US" sz="1200" dirty="0" smtClean="0"/>
-              <a:t>        Sim.R2G=66.66;</a:t>
-            </a:r>
-          </a:p>
-          <a:p>
-            <a:r>
-              <a:rPr lang="en-US" sz="1200" dirty="0" smtClean="0"/>
-              <a:t>        </a:t>
-            </a:r>
-            <a:r>
-              <a:rPr lang="en-US" sz="1200" dirty="0" err="1" smtClean="0"/>
-              <a:t>Sim.fG</a:t>
-            </a:r>
-            <a:r>
-              <a:rPr lang="en-US" sz="1200" dirty="0" smtClean="0"/>
-              <a:t>=0.0009; </a:t>
-            </a:r>
-          </a:p>
-          <a:p>
-            <a:r>
-              <a:rPr lang="en-US" sz="1200" dirty="0" smtClean="0"/>
-              <a:t>        </a:t>
-            </a:r>
-            <a:r>
-              <a:rPr lang="en-US" sz="1200" dirty="0" err="1" smtClean="0"/>
-              <a:t>Sim.kGA</a:t>
-            </a:r>
-            <a:r>
-              <a:rPr lang="en-US" sz="1200" dirty="0" smtClean="0"/>
-              <a:t>=5000;</a:t>
-            </a:r>
-          </a:p>
-          <a:p>
-            <a:endParaRPr lang="en-US" dirty="0"/>
-          </a:p>
-        </p:txBody>
-      </p:sp>
-    </p:spTree>
-    <p:extLst>
-      <p:ext uri="{BB962C8B-B14F-4D97-AF65-F5344CB8AC3E}">
-        <p14:creationId xmlns:p14="http://schemas.microsoft.com/office/powerpoint/2010/main" val="2862043922"/>
-      </p:ext>
-    </p:extLst>
-  </p:cSld>
-  <p:clrMapOvr>
-    <a:masterClrMapping/>
-  </p:clrMapOvr>
-</p:sld>
-</file>
-
-<file path=ppt/slides/slide15.xml><?xml version="1.0" encoding="utf-8"?>
-<p:sld xmlns:a="http://schemas.openxmlformats.org/drawingml/2006/main" xmlns:r="http://schemas.openxmlformats.org/officeDocument/2006/relationships" xmlns:p="http://schemas.openxmlformats.org/presentationml/2006/main">
-  <p:cSld>
-    <p:spTree>
-      <p:nvGrpSpPr>
-        <p:cNvPr id="1" name=""/>
-        <p:cNvGrpSpPr/>
-        <p:nvPr/>
-      </p:nvGrpSpPr>
-      <p:grpSpPr>
-        <a:xfrm>
-          <a:off x="0" y="0"/>
-          <a:ext cx="0" cy="0"/>
-          <a:chOff x="0" y="0"/>
-          <a:chExt cx="0" cy="0"/>
-        </a:xfrm>
-      </p:grpSpPr>
-      <p:sp>
-        <p:nvSpPr>
-          <p:cNvPr id="2" name="Titel 1"/>
-          <p:cNvSpPr>
-            <a:spLocks noGrp="1"/>
-          </p:cNvSpPr>
-          <p:nvPr>
-            <p:ph type="title"/>
-          </p:nvPr>
-        </p:nvSpPr>
-        <p:spPr/>
-        <p:txBody>
-          <a:bodyPr/>
-          <a:lstStyle/>
-          <a:p>
-            <a:endParaRPr lang="en-US"/>
-          </a:p>
-        </p:txBody>
-      </p:sp>
-      <p:sp>
-        <p:nvSpPr>
-          <p:cNvPr id="3" name="Inhaltsplatzhalter 2"/>
-          <p:cNvSpPr>
-            <a:spLocks noGrp="1"/>
-          </p:cNvSpPr>
-          <p:nvPr>
-            <p:ph idx="1"/>
-          </p:nvPr>
-        </p:nvSpPr>
-        <p:spPr/>
-        <p:txBody>
-          <a:bodyPr/>
-          <a:lstStyle/>
-          <a:p>
-            <a:endParaRPr lang="en-US"/>
-          </a:p>
-        </p:txBody>
-      </p:sp>
-      <p:pic>
-        <p:nvPicPr>
-          <p:cNvPr id="4" name="Grafik 3"/>
-          <p:cNvPicPr>
-            <a:picLocks noChangeAspect="1"/>
-          </p:cNvPicPr>
-          <p:nvPr/>
-        </p:nvPicPr>
-        <p:blipFill>
-          <a:blip r:embed="rId2"/>
-          <a:stretch>
-            <a:fillRect/>
-          </a:stretch>
-        </p:blipFill>
-        <p:spPr>
-          <a:xfrm>
-            <a:off x="195941" y="143724"/>
-            <a:ext cx="11785537" cy="6536994"/>
-          </a:xfrm>
-          <a:prstGeom prst="rect">
-            <a:avLst/>
-          </a:prstGeom>
-        </p:spPr>
-      </p:pic>
-    </p:spTree>
-    <p:extLst>
-      <p:ext uri="{BB962C8B-B14F-4D97-AF65-F5344CB8AC3E}">
-        <p14:creationId xmlns:p14="http://schemas.microsoft.com/office/powerpoint/2010/main" val="3874179921"/>
       </p:ext>
     </p:extLst>
   </p:cSld>
@@ -6740,56 +6744,6 @@
             <a:pPr marL="0" indent="0">
               <a:buNone/>
             </a:pPr>
-            <a:r>
-              <a:rPr lang="en-US" sz="2000" dirty="0" smtClean="0"/>
-              <a:t>A loop creates a whole space of solutions the NUMERIC_SPACE or ANALYTIC_SPACE </a:t>
-            </a:r>
-          </a:p>
-          <a:p>
-            <a:pPr marL="0" indent="0">
-              <a:buNone/>
-            </a:pPr>
-            <a:r>
-              <a:rPr lang="en-US" sz="2000" dirty="0" smtClean="0"/>
-              <a:t>NUMERIC_SPACE.(field){ii} = NUMERIC_SIM(Sim);</a:t>
-            </a:r>
-          </a:p>
-          <a:p>
-            <a:pPr marL="0" indent="0">
-              <a:buNone/>
-            </a:pPr>
-            <a:r>
-              <a:rPr lang="en-US" sz="2000" dirty="0" smtClean="0"/>
-              <a:t>ANALYTIC_SPACE.(field){ii} = ANALYTIC_SIM(Sim);</a:t>
-            </a:r>
-          </a:p>
-          <a:p>
-            <a:pPr marL="0" indent="0">
-              <a:buNone/>
-            </a:pPr>
-            <a:endParaRPr lang="en-US" sz="2000" dirty="0" smtClean="0"/>
-          </a:p>
-          <a:p>
-            <a:pPr marL="0" indent="0">
-              <a:buNone/>
-            </a:pPr>
-            <a:r>
-              <a:rPr lang="en-US" sz="2000" dirty="0" smtClean="0"/>
-              <a:t>Outcomes (Z-spectra, Asymmetry and R1p are plotted via PLOT_SPACE(</a:t>
-            </a:r>
-            <a:r>
-              <a:rPr lang="en-US" sz="2000" dirty="0" err="1" smtClean="0"/>
-              <a:t>Sim,Space,NUMERIC_SPACE,ANALYTIC_SPACE</a:t>
-            </a:r>
-            <a:r>
-              <a:rPr lang="en-US" sz="2000" dirty="0" smtClean="0"/>
-              <a:t>);</a:t>
-            </a:r>
-          </a:p>
-          <a:p>
-            <a:pPr marL="0" indent="0">
-              <a:buNone/>
-            </a:pPr>
             <a:endParaRPr lang="en-US" sz="2000" dirty="0" smtClean="0"/>
           </a:p>
           <a:p>
@@ -6876,28 +6830,28 @@
                 <a:gridCol w="1245027">
                   <a:extLst>
                     <a:ext uri="{9D8B030D-6E8A-4147-A177-3AD203B41FA5}">
-                      <a16:colId xmlns:a16="http://schemas.microsoft.com/office/drawing/2014/main" val="3796756512"/>
+                      <a16:colId xmlns:a16="http://schemas.microsoft.com/office/drawing/2014/main" xmlns="" val="3796756512"/>
                     </a:ext>
                   </a:extLst>
                 </a:gridCol>
                 <a:gridCol w="4462671">
                   <a:extLst>
                     <a:ext uri="{9D8B030D-6E8A-4147-A177-3AD203B41FA5}">
-                      <a16:colId xmlns:a16="http://schemas.microsoft.com/office/drawing/2014/main" val="1194976189"/>
+                      <a16:colId xmlns:a16="http://schemas.microsoft.com/office/drawing/2014/main" xmlns="" val="1194976189"/>
                     </a:ext>
                   </a:extLst>
                 </a:gridCol>
                 <a:gridCol w="1042390">
                   <a:extLst>
                     <a:ext uri="{9D8B030D-6E8A-4147-A177-3AD203B41FA5}">
-                      <a16:colId xmlns:a16="http://schemas.microsoft.com/office/drawing/2014/main" val="915624692"/>
+                      <a16:colId xmlns:a16="http://schemas.microsoft.com/office/drawing/2014/main" xmlns="" val="915624692"/>
                     </a:ext>
                   </a:extLst>
                 </a:gridCol>
                 <a:gridCol w="4665306">
                   <a:extLst>
                     <a:ext uri="{9D8B030D-6E8A-4147-A177-3AD203B41FA5}">
-                      <a16:colId xmlns:a16="http://schemas.microsoft.com/office/drawing/2014/main" val="475773509"/>
+                      <a16:colId xmlns:a16="http://schemas.microsoft.com/office/drawing/2014/main" xmlns="" val="475773509"/>
                     </a:ext>
                   </a:extLst>
                 </a:gridCol>
@@ -6959,7 +6913,7 @@
                 </a:tc>
                 <a:extLst>
                   <a:ext uri="{0D108BD9-81ED-4DB2-BD59-A6C34878D82A}">
-                    <a16:rowId xmlns:a16="http://schemas.microsoft.com/office/drawing/2014/main" val="1996644174"/>
+                    <a16:rowId xmlns:a16="http://schemas.microsoft.com/office/drawing/2014/main" xmlns="" val="1996644174"/>
                   </a:ext>
                 </a:extLst>
               </a:tr>
@@ -7041,7 +6995,7 @@
                 </a:tc>
                 <a:extLst>
                   <a:ext uri="{0D108BD9-81ED-4DB2-BD59-A6C34878D82A}">
-                    <a16:rowId xmlns:a16="http://schemas.microsoft.com/office/drawing/2014/main" val="2160961209"/>
+                    <a16:rowId xmlns:a16="http://schemas.microsoft.com/office/drawing/2014/main" xmlns="" val="2160961209"/>
                   </a:ext>
                 </a:extLst>
               </a:tr>
@@ -7153,7 +7107,7 @@
                 </a:tc>
                 <a:extLst>
                   <a:ext uri="{0D108BD9-81ED-4DB2-BD59-A6C34878D82A}">
-                    <a16:rowId xmlns:a16="http://schemas.microsoft.com/office/drawing/2014/main" val="3593929701"/>
+                    <a16:rowId xmlns:a16="http://schemas.microsoft.com/office/drawing/2014/main" xmlns="" val="3593929701"/>
                   </a:ext>
                 </a:extLst>
               </a:tr>
@@ -7320,7 +7274,7 @@
                 </a:tc>
                 <a:extLst>
                   <a:ext uri="{0D108BD9-81ED-4DB2-BD59-A6C34878D82A}">
-                    <a16:rowId xmlns:a16="http://schemas.microsoft.com/office/drawing/2014/main" val="3049241760"/>
+                    <a16:rowId xmlns:a16="http://schemas.microsoft.com/office/drawing/2014/main" xmlns="" val="3049241760"/>
                   </a:ext>
                 </a:extLst>
               </a:tr>
@@ -7460,7 +7414,7 @@
                 </a:tc>
                 <a:extLst>
                   <a:ext uri="{0D108BD9-81ED-4DB2-BD59-A6C34878D82A}">
-                    <a16:rowId xmlns:a16="http://schemas.microsoft.com/office/drawing/2014/main" val="2824325918"/>
+                    <a16:rowId xmlns:a16="http://schemas.microsoft.com/office/drawing/2014/main" xmlns="" val="2824325918"/>
                   </a:ext>
                 </a:extLst>
               </a:tr>
@@ -7547,7 +7501,7 @@
                 </a:tc>
                 <a:extLst>
                   <a:ext uri="{0D108BD9-81ED-4DB2-BD59-A6C34878D82A}">
-                    <a16:rowId xmlns:a16="http://schemas.microsoft.com/office/drawing/2014/main" val="876470021"/>
+                    <a16:rowId xmlns:a16="http://schemas.microsoft.com/office/drawing/2014/main" xmlns="" val="876470021"/>
                   </a:ext>
                 </a:extLst>
               </a:tr>
@@ -7751,7 +7705,7 @@
                 </a:tc>
                 <a:extLst>
                   <a:ext uri="{0D108BD9-81ED-4DB2-BD59-A6C34878D82A}">
-                    <a16:rowId xmlns:a16="http://schemas.microsoft.com/office/drawing/2014/main" val="4151960913"/>
+                    <a16:rowId xmlns:a16="http://schemas.microsoft.com/office/drawing/2014/main" xmlns="" val="4151960913"/>
                   </a:ext>
                 </a:extLst>
               </a:tr>
@@ -7905,7 +7859,7 @@
                 </a:tc>
                 <a:extLst>
                   <a:ext uri="{0D108BD9-81ED-4DB2-BD59-A6C34878D82A}">
-                    <a16:rowId xmlns:a16="http://schemas.microsoft.com/office/drawing/2014/main" val="1264425955"/>
+                    <a16:rowId xmlns:a16="http://schemas.microsoft.com/office/drawing/2014/main" xmlns="" val="1264425955"/>
                   </a:ext>
                 </a:extLst>
               </a:tr>
@@ -8077,7 +8031,7 @@
                 </a:tc>
                 <a:extLst>
                   <a:ext uri="{0D108BD9-81ED-4DB2-BD59-A6C34878D82A}">
-                    <a16:rowId xmlns:a16="http://schemas.microsoft.com/office/drawing/2014/main" val="2183035704"/>
+                    <a16:rowId xmlns:a16="http://schemas.microsoft.com/office/drawing/2014/main" xmlns="" val="2183035704"/>
                   </a:ext>
                 </a:extLst>
               </a:tr>
@@ -8252,7 +8206,7 @@
                 </a:tc>
                 <a:extLst>
                   <a:ext uri="{0D108BD9-81ED-4DB2-BD59-A6C34878D82A}">
-                    <a16:rowId xmlns:a16="http://schemas.microsoft.com/office/drawing/2014/main" val="3203385244"/>
+                    <a16:rowId xmlns:a16="http://schemas.microsoft.com/office/drawing/2014/main" xmlns="" val="3203385244"/>
                   </a:ext>
                 </a:extLst>
               </a:tr>
@@ -8393,7 +8347,7 @@
                 </a:tc>
                 <a:extLst>
                   <a:ext uri="{0D108BD9-81ED-4DB2-BD59-A6C34878D82A}">
-                    <a16:rowId xmlns:a16="http://schemas.microsoft.com/office/drawing/2014/main" val="2467174945"/>
+                    <a16:rowId xmlns:a16="http://schemas.microsoft.com/office/drawing/2014/main" xmlns="" val="2467174945"/>
                   </a:ext>
                 </a:extLst>
               </a:tr>
@@ -8497,28 +8451,28 @@
                 <a:gridCol w="1792668">
                   <a:extLst>
                     <a:ext uri="{9D8B030D-6E8A-4147-A177-3AD203B41FA5}">
-                      <a16:colId xmlns:a16="http://schemas.microsoft.com/office/drawing/2014/main" val="2274445544"/>
+                      <a16:colId xmlns:a16="http://schemas.microsoft.com/office/drawing/2014/main" xmlns="" val="2274445544"/>
                     </a:ext>
                   </a:extLst>
                 </a:gridCol>
                 <a:gridCol w="3726985">
                   <a:extLst>
                     <a:ext uri="{9D8B030D-6E8A-4147-A177-3AD203B41FA5}">
-                      <a16:colId xmlns:a16="http://schemas.microsoft.com/office/drawing/2014/main" val="3321561127"/>
+                      <a16:colId xmlns:a16="http://schemas.microsoft.com/office/drawing/2014/main" xmlns="" val="3321561127"/>
                     </a:ext>
                   </a:extLst>
                 </a:gridCol>
                 <a:gridCol w="2759826">
                   <a:extLst>
                     <a:ext uri="{9D8B030D-6E8A-4147-A177-3AD203B41FA5}">
-                      <a16:colId xmlns:a16="http://schemas.microsoft.com/office/drawing/2014/main" val="1656681161"/>
+                      <a16:colId xmlns:a16="http://schemas.microsoft.com/office/drawing/2014/main" xmlns="" val="1656681161"/>
                     </a:ext>
                   </a:extLst>
                 </a:gridCol>
                 <a:gridCol w="2759826">
                   <a:extLst>
                     <a:ext uri="{9D8B030D-6E8A-4147-A177-3AD203B41FA5}">
-                      <a16:colId xmlns:a16="http://schemas.microsoft.com/office/drawing/2014/main" val="1672008535"/>
+                      <a16:colId xmlns:a16="http://schemas.microsoft.com/office/drawing/2014/main" xmlns="" val="1672008535"/>
                     </a:ext>
                   </a:extLst>
                 </a:gridCol>
@@ -8586,7 +8540,7 @@
                 </a:tc>
                 <a:extLst>
                   <a:ext uri="{0D108BD9-81ED-4DB2-BD59-A6C34878D82A}">
-                    <a16:rowId xmlns:a16="http://schemas.microsoft.com/office/drawing/2014/main" val="4116161946"/>
+                    <a16:rowId xmlns:a16="http://schemas.microsoft.com/office/drawing/2014/main" xmlns="" val="4116161946"/>
                   </a:ext>
                 </a:extLst>
               </a:tr>
@@ -8701,7 +8655,7 @@
                 </a:tc>
                 <a:extLst>
                   <a:ext uri="{0D108BD9-81ED-4DB2-BD59-A6C34878D82A}">
-                    <a16:rowId xmlns:a16="http://schemas.microsoft.com/office/drawing/2014/main" val="2362704474"/>
+                    <a16:rowId xmlns:a16="http://schemas.microsoft.com/office/drawing/2014/main" xmlns="" val="2362704474"/>
                   </a:ext>
                 </a:extLst>
               </a:tr>
@@ -8841,7 +8795,7 @@
                 </a:tc>
                 <a:extLst>
                   <a:ext uri="{0D108BD9-81ED-4DB2-BD59-A6C34878D82A}">
-                    <a16:rowId xmlns:a16="http://schemas.microsoft.com/office/drawing/2014/main" val="3553129649"/>
+                    <a16:rowId xmlns:a16="http://schemas.microsoft.com/office/drawing/2014/main" xmlns="" val="3553129649"/>
                   </a:ext>
                 </a:extLst>
               </a:tr>
@@ -8953,7 +8907,7 @@
                 </a:tc>
                 <a:extLst>
                   <a:ext uri="{0D108BD9-81ED-4DB2-BD59-A6C34878D82A}">
-                    <a16:rowId xmlns:a16="http://schemas.microsoft.com/office/drawing/2014/main" val="1445146939"/>
+                    <a16:rowId xmlns:a16="http://schemas.microsoft.com/office/drawing/2014/main" xmlns="" val="1445146939"/>
                   </a:ext>
                 </a:extLst>
               </a:tr>
@@ -9129,7 +9083,7 @@
                 </a:tc>
                 <a:extLst>
                   <a:ext uri="{0D108BD9-81ED-4DB2-BD59-A6C34878D82A}">
-                    <a16:rowId xmlns:a16="http://schemas.microsoft.com/office/drawing/2014/main" val="2688249273"/>
+                    <a16:rowId xmlns:a16="http://schemas.microsoft.com/office/drawing/2014/main" xmlns="" val="2688249273"/>
                   </a:ext>
                 </a:extLst>
               </a:tr>
@@ -9283,7 +9237,7 @@
                 </a:tc>
                 <a:extLst>
                   <a:ext uri="{0D108BD9-81ED-4DB2-BD59-A6C34878D82A}">
-                    <a16:rowId xmlns:a16="http://schemas.microsoft.com/office/drawing/2014/main" val="1345758796"/>
+                    <a16:rowId xmlns:a16="http://schemas.microsoft.com/office/drawing/2014/main" xmlns="" val="1345758796"/>
                   </a:ext>
                 </a:extLst>
               </a:tr>
@@ -9536,7 +9490,7 @@
                 </a:tc>
                 <a:extLst>
                   <a:ext uri="{0D108BD9-81ED-4DB2-BD59-A6C34878D82A}">
-                    <a16:rowId xmlns:a16="http://schemas.microsoft.com/office/drawing/2014/main" val="2300965713"/>
+                    <a16:rowId xmlns:a16="http://schemas.microsoft.com/office/drawing/2014/main" xmlns="" val="2300965713"/>
                   </a:ext>
                 </a:extLst>
               </a:tr>
@@ -9624,7 +9578,7 @@
                 </a:tc>
                 <a:extLst>
                   <a:ext uri="{0D108BD9-81ED-4DB2-BD59-A6C34878D82A}">
-                    <a16:rowId xmlns:a16="http://schemas.microsoft.com/office/drawing/2014/main" val="1175669292"/>
+                    <a16:rowId xmlns:a16="http://schemas.microsoft.com/office/drawing/2014/main" xmlns="" val="1175669292"/>
                   </a:ext>
                 </a:extLst>
               </a:tr>
@@ -9688,7 +9642,7 @@
                 </a:tc>
                 <a:extLst>
                   <a:ext uri="{0D108BD9-81ED-4DB2-BD59-A6C34878D82A}">
-                    <a16:rowId xmlns:a16="http://schemas.microsoft.com/office/drawing/2014/main" val="1032078919"/>
+                    <a16:rowId xmlns:a16="http://schemas.microsoft.com/office/drawing/2014/main" xmlns="" val="1032078919"/>
                   </a:ext>
                 </a:extLst>
               </a:tr>
@@ -9735,7 +9689,7 @@
                 </a:tc>
                 <a:extLst>
                   <a:ext uri="{0D108BD9-81ED-4DB2-BD59-A6C34878D82A}">
-                    <a16:rowId xmlns:a16="http://schemas.microsoft.com/office/drawing/2014/main" val="1050443696"/>
+                    <a16:rowId xmlns:a16="http://schemas.microsoft.com/office/drawing/2014/main" xmlns="" val="1050443696"/>
                   </a:ext>
                 </a:extLst>
               </a:tr>
@@ -9823,27 +9777,14 @@
         </p:nvSpPr>
         <p:spPr/>
         <p:txBody>
-          <a:bodyPr>
-            <a:noAutofit/>
-          </a:bodyPr>
+          <a:bodyPr/>
           <a:lstStyle/>
           <a:p>
             <a:r>
-              <a:rPr lang="en-US" sz="2400" dirty="0" smtClean="0"/>
-              <a:t>The </a:t>
-            </a:r>
-            <a:r>
-              <a:rPr lang="en-US" sz="2400" dirty="0" err="1" smtClean="0"/>
-              <a:t>struct</a:t>
-            </a:r>
-            <a:r>
-              <a:rPr lang="en-US" sz="2400" dirty="0" smtClean="0"/>
-              <a:t> ‘Space‘ allows to define the simulated parameter space</a:t>
-            </a:r>
-            <a:br>
-              <a:rPr lang="en-US" sz="2400" dirty="0" smtClean="0"/>
-            </a:br>
-            <a:endParaRPr lang="en-US" sz="2400" dirty="0"/>
+              <a:rPr lang="de-DE" dirty="0" smtClean="0"/>
+              <a:t>3_BATCH_simulation_param_space</a:t>
+            </a:r>
+            <a:endParaRPr lang="en-US" dirty="0"/>
           </a:p>
         </p:txBody>
       </p:sp>
@@ -9857,24 +9798,163 @@
             <p:ph idx="1"/>
           </p:nvPr>
         </p:nvSpPr>
-        <p:spPr>
-          <a:xfrm>
-            <a:off x="838200" y="1517715"/>
-            <a:ext cx="10515600" cy="4351338"/>
-          </a:xfrm>
-        </p:spPr>
+        <p:spPr/>
         <p:txBody>
           <a:bodyPr>
-            <a:normAutofit fontScale="92500" lnSpcReduction="10000"/>
+            <a:normAutofit fontScale="92500" lnSpcReduction="20000"/>
           </a:bodyPr>
           <a:lstStyle/>
+          <a:p>
+            <a:r>
+              <a:rPr lang="de-DE" dirty="0" smtClean="0"/>
+              <a:t>Just </a:t>
+            </a:r>
+            <a:r>
+              <a:rPr lang="de-DE" dirty="0" err="1" smtClean="0"/>
+              <a:t>run</a:t>
+            </a:r>
+            <a:r>
+              <a:rPr lang="de-DE" dirty="0" smtClean="0"/>
+              <a:t> </a:t>
+            </a:r>
+            <a:r>
+              <a:rPr lang="de-DE" dirty="0" err="1" smtClean="0"/>
+              <a:t>the</a:t>
+            </a:r>
+            <a:r>
+              <a:rPr lang="de-DE" dirty="0" smtClean="0"/>
+              <a:t> </a:t>
+            </a:r>
+            <a:r>
+              <a:rPr lang="de-DE" dirty="0" err="1" smtClean="0"/>
+              <a:t>whole</a:t>
+            </a:r>
+            <a:r>
+              <a:rPr lang="de-DE" dirty="0" smtClean="0"/>
+              <a:t> </a:t>
+            </a:r>
+            <a:r>
+              <a:rPr lang="de-DE" dirty="0" err="1" smtClean="0"/>
+              <a:t>file</a:t>
+            </a:r>
+            <a:r>
+              <a:rPr lang="de-DE" dirty="0" smtClean="0"/>
+              <a:t> </a:t>
+            </a:r>
+            <a:r>
+              <a:rPr lang="de-DE" dirty="0" err="1" smtClean="0"/>
+              <a:t>or</a:t>
+            </a:r>
+            <a:r>
+              <a:rPr lang="de-DE" dirty="0" smtClean="0"/>
+              <a:t> individual </a:t>
+            </a:r>
+            <a:r>
+              <a:rPr lang="de-DE" dirty="0" err="1" smtClean="0"/>
+              <a:t>section</a:t>
+            </a:r>
+            <a:r>
+              <a:rPr lang="de-DE" dirty="0" smtClean="0"/>
+              <a:t> </a:t>
+            </a:r>
+            <a:r>
+              <a:rPr lang="de-DE" dirty="0" err="1" smtClean="0"/>
+              <a:t>one</a:t>
+            </a:r>
+            <a:r>
+              <a:rPr lang="de-DE" dirty="0" smtClean="0"/>
+              <a:t> after </a:t>
+            </a:r>
+            <a:r>
+              <a:rPr lang="de-DE" dirty="0" err="1" smtClean="0"/>
+              <a:t>another</a:t>
+            </a:r>
+            <a:endParaRPr lang="de-DE" dirty="0" smtClean="0"/>
+          </a:p>
+          <a:p>
+            <a:endParaRPr lang="de-DE" dirty="0"/>
+          </a:p>
+          <a:p>
+            <a:r>
+              <a:rPr lang="de-DE" dirty="0" err="1" smtClean="0"/>
+              <a:t>You</a:t>
+            </a:r>
+            <a:r>
+              <a:rPr lang="de-DE" dirty="0" smtClean="0"/>
+              <a:t> </a:t>
+            </a:r>
+            <a:r>
+              <a:rPr lang="de-DE" dirty="0" err="1" smtClean="0"/>
+              <a:t>should</a:t>
+            </a:r>
+            <a:r>
+              <a:rPr lang="de-DE" dirty="0" smtClean="0"/>
+              <a:t> </a:t>
+            </a:r>
+            <a:r>
+              <a:rPr lang="de-DE" dirty="0" err="1" smtClean="0"/>
+              <a:t>get</a:t>
+            </a:r>
+            <a:r>
+              <a:rPr lang="de-DE" dirty="0" smtClean="0"/>
+              <a:t> </a:t>
+            </a:r>
+            <a:r>
+              <a:rPr lang="de-DE" dirty="0" err="1" smtClean="0"/>
+              <a:t>the</a:t>
+            </a:r>
+            <a:r>
+              <a:rPr lang="de-DE" dirty="0" smtClean="0"/>
+              <a:t> </a:t>
+            </a:r>
+            <a:r>
+              <a:rPr lang="de-DE" dirty="0" err="1" smtClean="0"/>
+              <a:t>result</a:t>
+            </a:r>
+            <a:r>
+              <a:rPr lang="de-DE" dirty="0" smtClean="0"/>
+              <a:t> </a:t>
+            </a:r>
+            <a:r>
+              <a:rPr lang="de-DE" dirty="0" err="1" smtClean="0"/>
+              <a:t>of</a:t>
+            </a:r>
+            <a:r>
+              <a:rPr lang="de-DE" dirty="0" smtClean="0"/>
+              <a:t> </a:t>
+            </a:r>
+            <a:r>
+              <a:rPr lang="de-DE" dirty="0" err="1" smtClean="0"/>
+              <a:t>the</a:t>
+            </a:r>
+            <a:r>
+              <a:rPr lang="de-DE" dirty="0" smtClean="0"/>
+              <a:t> </a:t>
+            </a:r>
+            <a:r>
+              <a:rPr lang="de-DE" dirty="0" err="1" smtClean="0"/>
+              <a:t>following</a:t>
+            </a:r>
+            <a:r>
+              <a:rPr lang="de-DE" dirty="0" smtClean="0"/>
+              <a:t> </a:t>
+            </a:r>
+            <a:r>
+              <a:rPr lang="de-DE" dirty="0" err="1" smtClean="0"/>
+              <a:t>slides</a:t>
+            </a:r>
+            <a:endParaRPr lang="de-DE" dirty="0" smtClean="0"/>
+          </a:p>
+          <a:p>
+            <a:endParaRPr lang="de-DE" dirty="0"/>
+          </a:p>
           <a:p>
             <a:pPr marL="0" indent="0">
               <a:buNone/>
             </a:pPr>
             <a:r>
-              <a:rPr lang="en-US" dirty="0" smtClean="0"/>
-              <a:t>The standard parameters get loaded and then one parameter gets changed as defined in ‘Space’.</a:t>
+              <a:rPr lang="en-US" dirty="0"/>
+              <a:t>A loop creates a whole space of solutions the NUMERIC_SPACE or ANALYTIC_SPACE </a:t>
             </a:r>
           </a:p>
           <a:p>
@@ -9882,8 +9962,8 @@
               <a:buNone/>
             </a:pPr>
             <a:r>
-              <a:rPr lang="en-US" dirty="0" smtClean="0"/>
-              <a:t>Thus</a:t>
+              <a:rPr lang="en-US" dirty="0"/>
+              <a:t>NUMERIC_SPACE.(field){ii} = NUMERIC_SIM(Sim);</a:t>
             </a:r>
           </a:p>
           <a:p>
@@ -9891,129 +9971,32 @@
               <a:buNone/>
             </a:pPr>
             <a:r>
-              <a:rPr lang="en-US" dirty="0" err="1" smtClean="0">
-                <a:latin typeface="Courier" pitchFamily="49" charset="0"/>
-              </a:rPr>
-              <a:t>Space.n</a:t>
-            </a:r>
-            <a:r>
-              <a:rPr lang="en-US" dirty="0" smtClean="0">
-                <a:latin typeface="Courier" pitchFamily="49" charset="0"/>
-              </a:rPr>
-              <a:t>     = [1 2 3 5 10];</a:t>
+              <a:rPr lang="en-US" dirty="0"/>
+              <a:t>ANALYTIC_SPACE.(field){ii} = ANALYTIC_SIM(Sim);</a:t>
             </a:r>
           </a:p>
           <a:p>
             <a:pPr marL="0" indent="0">
               <a:buNone/>
             </a:pPr>
-            <a:r>
-              <a:rPr lang="en-US" dirty="0" smtClean="0">
-                <a:latin typeface="Courier" pitchFamily="49" charset="0"/>
-              </a:rPr>
-              <a:t>Space.tp    = [0.05 0.1];</a:t>
-            </a:r>
+            <a:endParaRPr lang="en-US" dirty="0"/>
           </a:p>
           <a:p>
             <a:pPr marL="0" indent="0">
               <a:buNone/>
             </a:pPr>
             <a:r>
-              <a:rPr lang="en-US" dirty="0" smtClean="0">
-                <a:latin typeface="Courier" pitchFamily="49" charset="0"/>
-              </a:rPr>
-              <a:t>Space.B1    = [0.8 1.6 3.2];</a:t>
-            </a:r>
-          </a:p>
-          <a:p>
-            <a:pPr marL="0" indent="0">
-              <a:buNone/>
-            </a:pPr>
-            <a:r>
-              <a:rPr lang="en-US" dirty="0" smtClean="0"/>
-              <a:t>Creates 3 Plots: </a:t>
-            </a:r>
-          </a:p>
-          <a:p>
-            <a:pPr marL="514350" indent="-514350">
-              <a:buAutoNum type="arabicPeriod"/>
-            </a:pPr>
-            <a:r>
-              <a:rPr lang="en-US" dirty="0" smtClean="0"/>
-              <a:t>Z-spectra with standard </a:t>
-            </a:r>
-            <a:r>
-              <a:rPr lang="en-US" dirty="0" err="1" smtClean="0"/>
-              <a:t>params</a:t>
-            </a:r>
-            <a:r>
-              <a:rPr lang="en-US" dirty="0" smtClean="0"/>
-              <a:t> (also </a:t>
-            </a:r>
-            <a:r>
-              <a:rPr lang="en-US" dirty="0" err="1" smtClean="0"/>
-              <a:t>tp</a:t>
-            </a:r>
-            <a:r>
-              <a:rPr lang="en-US" dirty="0" smtClean="0"/>
-              <a:t> and B1) but varying n</a:t>
-            </a:r>
-          </a:p>
-          <a:p>
-            <a:pPr marL="514350" indent="-514350">
-              <a:buFont typeface="Arial" panose="020B0604020202020204" pitchFamily="34" charset="0"/>
-              <a:buAutoNum type="arabicPeriod"/>
-            </a:pPr>
-            <a:r>
-              <a:rPr lang="en-US" dirty="0" smtClean="0"/>
-              <a:t>Z-spectra with standard </a:t>
-            </a:r>
-            <a:r>
-              <a:rPr lang="en-US" dirty="0" err="1" smtClean="0"/>
-              <a:t>params</a:t>
-            </a:r>
-            <a:r>
-              <a:rPr lang="en-US" dirty="0" smtClean="0"/>
-              <a:t> (also n and B1) but varying </a:t>
-            </a:r>
-            <a:r>
-              <a:rPr lang="en-US" dirty="0" err="1" smtClean="0"/>
-              <a:t>tp</a:t>
-            </a:r>
-            <a:endParaRPr lang="en-US" dirty="0" smtClean="0"/>
-          </a:p>
-          <a:p>
-            <a:pPr marL="514350" indent="-514350">
-              <a:buFont typeface="Arial" panose="020B0604020202020204" pitchFamily="34" charset="0"/>
-              <a:buAutoNum type="arabicPeriod"/>
-            </a:pPr>
-            <a:r>
-              <a:rPr lang="en-US" dirty="0" smtClean="0"/>
-              <a:t>Z-spectra with standard </a:t>
-            </a:r>
-            <a:r>
-              <a:rPr lang="en-US" dirty="0" err="1" smtClean="0"/>
-              <a:t>params</a:t>
-            </a:r>
-            <a:r>
-              <a:rPr lang="en-US" dirty="0" smtClean="0"/>
-              <a:t> (also </a:t>
-            </a:r>
-            <a:r>
-              <a:rPr lang="en-US" dirty="0" err="1" smtClean="0"/>
-              <a:t>tp</a:t>
-            </a:r>
-            <a:r>
-              <a:rPr lang="en-US" dirty="0" smtClean="0"/>
-              <a:t> and n) but varying B1</a:t>
-            </a:r>
-          </a:p>
-          <a:p>
-            <a:pPr marL="514350" indent="-514350">
-              <a:buFont typeface="Arial" panose="020B0604020202020204" pitchFamily="34" charset="0"/>
-              <a:buAutoNum type="arabicPeriod"/>
-            </a:pPr>
-            <a:endParaRPr lang="en-US" dirty="0" smtClean="0"/>
+              <a:rPr lang="en-US" dirty="0"/>
+              <a:t>Outcomes (Z-spectra, Asymmetry and R1p are plotted via PLOT_SPACE(</a:t>
+            </a:r>
+            <a:r>
+              <a:rPr lang="en-US" dirty="0" err="1"/>
+              <a:t>Sim,Space,NUMERIC_SPACE,ANALYTIC_SPACE</a:t>
+            </a:r>
+            <a:r>
+              <a:rPr lang="en-US" dirty="0"/>
+              <a:t>);</a:t>
+            </a:r>
           </a:p>
           <a:p>
             <a:endParaRPr lang="en-US" dirty="0"/>
@@ -10023,7 +10006,7 @@
     </p:spTree>
     <p:extLst>
       <p:ext uri="{BB962C8B-B14F-4D97-AF65-F5344CB8AC3E}">
-        <p14:creationId xmlns:p14="http://schemas.microsoft.com/office/powerpoint/2010/main" val="1793505248"/>
+        <p14:creationId xmlns:p14="http://schemas.microsoft.com/office/powerpoint/2010/main" val="441077466"/>
       </p:ext>
     </p:extLst>
   </p:cSld>
@@ -10062,14 +10045,27 @@
         </p:nvSpPr>
         <p:spPr/>
         <p:txBody>
-          <a:bodyPr/>
+          <a:bodyPr>
+            <a:noAutofit/>
+          </a:bodyPr>
           <a:lstStyle/>
           <a:p>
             <a:r>
-              <a:rPr lang="de-DE" dirty="0" err="1" smtClean="0"/>
-              <a:t>BATCH_simulation</a:t>
-            </a:r>
-            <a:endParaRPr lang="en-US" dirty="0"/>
+              <a:rPr lang="en-US" sz="2400" dirty="0" smtClean="0"/>
+              <a:t>The </a:t>
+            </a:r>
+            <a:r>
+              <a:rPr lang="en-US" sz="2400" dirty="0" err="1" smtClean="0"/>
+              <a:t>struct</a:t>
+            </a:r>
+            <a:r>
+              <a:rPr lang="en-US" sz="2400" dirty="0" smtClean="0"/>
+              <a:t> ‘Space‘ allows to define the simulated parameter space</a:t>
+            </a:r>
+            <a:br>
+              <a:rPr lang="en-US" sz="2400" dirty="0" smtClean="0"/>
+            </a:br>
+            <a:endParaRPr lang="en-US" sz="2400" dirty="0"/>
           </a:p>
         </p:txBody>
       </p:sp>
@@ -10083,149 +10079,165 @@
             <p:ph idx="1"/>
           </p:nvPr>
         </p:nvSpPr>
-        <p:spPr/>
-        <p:txBody>
-          <a:bodyPr/>
+        <p:spPr>
+          <a:xfrm>
+            <a:off x="838200" y="1517715"/>
+            <a:ext cx="10515600" cy="4351338"/>
+          </a:xfrm>
+        </p:spPr>
+        <p:txBody>
+          <a:bodyPr>
+            <a:normAutofit fontScale="92500" lnSpcReduction="10000"/>
+          </a:bodyPr>
           <a:lstStyle/>
           <a:p>
-            <a:r>
-              <a:rPr lang="de-DE" dirty="0" smtClean="0"/>
-              <a:t>Just </a:t>
-            </a:r>
-            <a:r>
-              <a:rPr lang="de-DE" dirty="0" err="1" smtClean="0"/>
-              <a:t>run</a:t>
-            </a:r>
-            <a:r>
-              <a:rPr lang="de-DE" dirty="0" smtClean="0"/>
-              <a:t> </a:t>
-            </a:r>
-            <a:r>
-              <a:rPr lang="de-DE" dirty="0" err="1" smtClean="0"/>
-              <a:t>the</a:t>
-            </a:r>
-            <a:r>
-              <a:rPr lang="de-DE" dirty="0" smtClean="0"/>
-              <a:t> </a:t>
-            </a:r>
-            <a:r>
-              <a:rPr lang="de-DE" dirty="0" err="1" smtClean="0"/>
-              <a:t>whole</a:t>
-            </a:r>
-            <a:r>
-              <a:rPr lang="de-DE" dirty="0" smtClean="0"/>
-              <a:t> </a:t>
-            </a:r>
-            <a:r>
-              <a:rPr lang="de-DE" dirty="0" err="1" smtClean="0"/>
-              <a:t>file</a:t>
-            </a:r>
-            <a:r>
-              <a:rPr lang="de-DE" dirty="0" smtClean="0"/>
-              <a:t> </a:t>
-            </a:r>
-            <a:r>
-              <a:rPr lang="de-DE" dirty="0" err="1" smtClean="0"/>
-              <a:t>or</a:t>
-            </a:r>
-            <a:r>
-              <a:rPr lang="de-DE" dirty="0" smtClean="0"/>
-              <a:t> individual </a:t>
-            </a:r>
-            <a:r>
-              <a:rPr lang="de-DE" dirty="0" err="1" smtClean="0"/>
-              <a:t>section</a:t>
-            </a:r>
-            <a:r>
-              <a:rPr lang="de-DE" dirty="0" smtClean="0"/>
-              <a:t> </a:t>
-            </a:r>
-            <a:r>
-              <a:rPr lang="de-DE" dirty="0" err="1" smtClean="0"/>
-              <a:t>one</a:t>
-            </a:r>
-            <a:r>
-              <a:rPr lang="de-DE" dirty="0" smtClean="0"/>
-              <a:t> after </a:t>
-            </a:r>
-            <a:r>
-              <a:rPr lang="de-DE" dirty="0" err="1" smtClean="0"/>
-              <a:t>another</a:t>
-            </a:r>
-            <a:endParaRPr lang="de-DE" dirty="0" smtClean="0"/>
-          </a:p>
-          <a:p>
-            <a:endParaRPr lang="de-DE" dirty="0"/>
-          </a:p>
-          <a:p>
-            <a:r>
-              <a:rPr lang="de-DE" dirty="0" err="1" smtClean="0"/>
-              <a:t>You</a:t>
-            </a:r>
-            <a:r>
-              <a:rPr lang="de-DE" dirty="0" smtClean="0"/>
-              <a:t> </a:t>
-            </a:r>
-            <a:r>
-              <a:rPr lang="de-DE" dirty="0" err="1" smtClean="0"/>
-              <a:t>should</a:t>
-            </a:r>
-            <a:r>
-              <a:rPr lang="de-DE" dirty="0" smtClean="0"/>
-              <a:t> </a:t>
-            </a:r>
-            <a:r>
-              <a:rPr lang="de-DE" dirty="0" err="1" smtClean="0"/>
-              <a:t>get</a:t>
-            </a:r>
-            <a:r>
-              <a:rPr lang="de-DE" dirty="0" smtClean="0"/>
-              <a:t> </a:t>
-            </a:r>
-            <a:r>
-              <a:rPr lang="de-DE" dirty="0" err="1" smtClean="0"/>
-              <a:t>the</a:t>
-            </a:r>
-            <a:r>
-              <a:rPr lang="de-DE" dirty="0" smtClean="0"/>
-              <a:t> </a:t>
-            </a:r>
-            <a:r>
-              <a:rPr lang="de-DE" dirty="0" err="1" smtClean="0"/>
-              <a:t>result</a:t>
-            </a:r>
-            <a:r>
-              <a:rPr lang="de-DE" dirty="0" smtClean="0"/>
-              <a:t> </a:t>
-            </a:r>
-            <a:r>
-              <a:rPr lang="de-DE" dirty="0" err="1" smtClean="0"/>
-              <a:t>of</a:t>
-            </a:r>
-            <a:r>
-              <a:rPr lang="de-DE" dirty="0" smtClean="0"/>
-              <a:t> </a:t>
-            </a:r>
-            <a:r>
-              <a:rPr lang="de-DE" dirty="0" err="1" smtClean="0"/>
-              <a:t>the</a:t>
-            </a:r>
-            <a:r>
-              <a:rPr lang="de-DE" dirty="0" smtClean="0"/>
-              <a:t> </a:t>
-            </a:r>
-            <a:r>
-              <a:rPr lang="de-DE" dirty="0" err="1" smtClean="0"/>
-              <a:t>following</a:t>
-            </a:r>
-            <a:r>
-              <a:rPr lang="de-DE" dirty="0" smtClean="0"/>
-              <a:t> </a:t>
-            </a:r>
-            <a:r>
-              <a:rPr lang="de-DE" dirty="0" err="1" smtClean="0"/>
-              <a:t>slide</a:t>
-            </a:r>
+            <a:pPr marL="0" indent="0">
+              <a:buNone/>
+            </a:pPr>
+            <a:r>
+              <a:rPr lang="en-US" dirty="0" smtClean="0"/>
+              <a:t>The standard parameters get loaded and then one parameter gets changed as defined in ‘Space’.</a:t>
+            </a:r>
+          </a:p>
+          <a:p>
+            <a:pPr marL="0" indent="0">
+              <a:buNone/>
+            </a:pPr>
+            <a:r>
+              <a:rPr lang="en-US" dirty="0" smtClean="0"/>
+              <a:t>Thus</a:t>
+            </a:r>
+          </a:p>
+          <a:p>
+            <a:pPr marL="0" indent="0">
+              <a:buNone/>
+            </a:pPr>
+            <a:r>
+              <a:rPr lang="en-US" dirty="0" err="1" smtClean="0">
+                <a:latin typeface="Courier" pitchFamily="49" charset="0"/>
+              </a:rPr>
+              <a:t>Space.n</a:t>
+            </a:r>
+            <a:r>
+              <a:rPr lang="en-US" dirty="0" smtClean="0">
+                <a:latin typeface="Courier" pitchFamily="49" charset="0"/>
+              </a:rPr>
+              <a:t>     = [1 2 3 5 10];</a:t>
+            </a:r>
+          </a:p>
+          <a:p>
+            <a:pPr marL="0" indent="0">
+              <a:buNone/>
+            </a:pPr>
+            <a:r>
+              <a:rPr lang="en-US" dirty="0" smtClean="0">
+                <a:latin typeface="Courier" pitchFamily="49" charset="0"/>
+              </a:rPr>
+              <a:t>Space.tp    = [0.05 0.1];</a:t>
+            </a:r>
+          </a:p>
+          <a:p>
+            <a:pPr marL="0" indent="0">
+              <a:buNone/>
+            </a:pPr>
+            <a:r>
+              <a:rPr lang="en-US" dirty="0" smtClean="0">
+                <a:latin typeface="Courier" pitchFamily="49" charset="0"/>
+              </a:rPr>
+              <a:t>Space.B1    = [0.8 1.6 3.2];</a:t>
+            </a:r>
+          </a:p>
+          <a:p>
+            <a:pPr marL="0" indent="0">
+              <a:buNone/>
+            </a:pPr>
+            <a:r>
+              <a:rPr lang="en-US" dirty="0" smtClean="0"/>
+              <a:t>Creates 3 Plots: </a:t>
+            </a:r>
+          </a:p>
+          <a:p>
+            <a:pPr marL="514350" indent="-514350">
+              <a:buAutoNum type="arabicPeriod"/>
+            </a:pPr>
+            <a:r>
+              <a:rPr lang="en-US" dirty="0" smtClean="0"/>
+              <a:t>Z-spectra with standard </a:t>
+            </a:r>
+            <a:r>
+              <a:rPr lang="en-US" dirty="0" err="1" smtClean="0"/>
+              <a:t>params</a:t>
+            </a:r>
+            <a:r>
+              <a:rPr lang="en-US" dirty="0" smtClean="0"/>
+              <a:t> (also </a:t>
+            </a:r>
+            <a:r>
+              <a:rPr lang="en-US" dirty="0" err="1" smtClean="0"/>
+              <a:t>tp</a:t>
+            </a:r>
+            <a:r>
+              <a:rPr lang="en-US" dirty="0" smtClean="0"/>
+              <a:t> and B1) but varying n</a:t>
+            </a:r>
+          </a:p>
+          <a:p>
+            <a:pPr marL="514350" indent="-514350">
+              <a:buFont typeface="Arial" panose="020B0604020202020204" pitchFamily="34" charset="0"/>
+              <a:buAutoNum type="arabicPeriod"/>
+            </a:pPr>
+            <a:r>
+              <a:rPr lang="en-US" dirty="0" smtClean="0"/>
+              <a:t>Z-spectra with standard </a:t>
+            </a:r>
+            <a:r>
+              <a:rPr lang="en-US" dirty="0" err="1" smtClean="0"/>
+              <a:t>params</a:t>
+            </a:r>
+            <a:r>
+              <a:rPr lang="en-US" dirty="0" smtClean="0"/>
+              <a:t> (also n and B1) but varying </a:t>
+            </a:r>
+            <a:r>
+              <a:rPr lang="en-US" dirty="0" err="1" smtClean="0"/>
+              <a:t>tp</a:t>
+            </a:r>
+            <a:endParaRPr lang="en-US" dirty="0" smtClean="0"/>
+          </a:p>
+          <a:p>
+            <a:pPr marL="514350" indent="-514350">
+              <a:buFont typeface="Arial" panose="020B0604020202020204" pitchFamily="34" charset="0"/>
+              <a:buAutoNum type="arabicPeriod"/>
+            </a:pPr>
+            <a:r>
+              <a:rPr lang="en-US" dirty="0" smtClean="0"/>
+              <a:t>Z-spectra with standard </a:t>
+            </a:r>
+            <a:r>
+              <a:rPr lang="en-US" dirty="0" err="1" smtClean="0"/>
+              <a:t>params</a:t>
+            </a:r>
+            <a:r>
+              <a:rPr lang="en-US" dirty="0" smtClean="0"/>
+              <a:t> (also </a:t>
+            </a:r>
+            <a:r>
+              <a:rPr lang="en-US" dirty="0" err="1" smtClean="0"/>
+              <a:t>tp</a:t>
+            </a:r>
+            <a:r>
+              <a:rPr lang="en-US" dirty="0" smtClean="0"/>
+              <a:t> and n) but varying B1</a:t>
+            </a:r>
+          </a:p>
+          <a:p>
+            <a:pPr marL="514350" indent="-514350">
+              <a:buFont typeface="Arial" panose="020B0604020202020204" pitchFamily="34" charset="0"/>
+              <a:buAutoNum type="arabicPeriod"/>
+            </a:pPr>
+            <a:endParaRPr lang="en-US" dirty="0" smtClean="0"/>
+          </a:p>
+          <a:p>
             <a:endParaRPr lang="en-US" dirty="0"/>
           </a:p>
         </p:txBody>
@@ -10233,7 +10245,7 @@
     </p:spTree>
     <p:extLst>
       <p:ext uri="{BB962C8B-B14F-4D97-AF65-F5344CB8AC3E}">
-        <p14:creationId xmlns:p14="http://schemas.microsoft.com/office/powerpoint/2010/main" val="441077466"/>
+        <p14:creationId xmlns:p14="http://schemas.microsoft.com/office/powerpoint/2010/main" val="1793505248"/>
       </p:ext>
     </p:extLst>
   </p:cSld>

</xml_diff>